<commit_message>
Collated video presentations into final video
</commit_message>
<xml_diff>
--- a/Phase 4 Documentation/Team_2_Presentation_4_V2.pptx
+++ b/Phase 4 Documentation/Team_2_Presentation_4_V2.pptx
@@ -2013,7 +2013,7 @@
   <dgm:whole/>
   <dgm:extLst>
     <a:ext uri="http://schemas.microsoft.com/office/drawing/2008/diagram">
-      <dsp:dataModelExt xmlns:dsp="http://schemas.microsoft.com/office/drawing/2008/diagram" relId="rId6" minVer="http://schemas.openxmlformats.org/drawingml/2006/diagram"/>
+      <dsp:dataModelExt xmlns:dsp="http://schemas.microsoft.com/office/drawing/2008/diagram" relId="rId7" minVer="http://schemas.openxmlformats.org/drawingml/2006/diagram"/>
     </a:ext>
   </dgm:extLst>
 </dgm:dataModel>
@@ -2411,7 +2411,7 @@
   <dgm:whole/>
   <dgm:extLst>
     <a:ext uri="http://schemas.microsoft.com/office/drawing/2008/diagram">
-      <dsp:dataModelExt xmlns:dsp="http://schemas.microsoft.com/office/drawing/2008/diagram" relId="rId6" minVer="http://schemas.openxmlformats.org/drawingml/2006/diagram"/>
+      <dsp:dataModelExt xmlns:dsp="http://schemas.microsoft.com/office/drawing/2008/diagram" relId="rId7" minVer="http://schemas.openxmlformats.org/drawingml/2006/diagram"/>
     </a:ext>
   </dgm:extLst>
 </dgm:dataModel>
@@ -6527,7 +6527,10 @@
           <a:bodyPr/>
           <a:lstStyle/>
           <a:p>
-            <a:endParaRPr lang="en-US" dirty="0"/>
+            <a:r>
+              <a:rPr lang="en-US" dirty="0"/>
+              <a:t>Duncan</a:t>
+            </a:r>
           </a:p>
         </p:txBody>
       </p:sp>
@@ -6558,6 +6561,704 @@
     <p:extLst>
       <p:ext uri="{BB962C8B-B14F-4D97-AF65-F5344CB8AC3E}">
         <p14:creationId xmlns:p14="http://schemas.microsoft.com/office/powerpoint/2010/main" val="910294267"/>
+      </p:ext>
+    </p:extLst>
+  </p:cSld>
+  <p:clrMapOvr>
+    <a:masterClrMapping/>
+  </p:clrMapOvr>
+</p:notes>
+</file>
+
+<file path=ppt/notesSlides/notesSlide2.xml><?xml version="1.0" encoding="utf-8"?>
+<p:notes xmlns:a="http://schemas.openxmlformats.org/drawingml/2006/main" xmlns:r="http://schemas.openxmlformats.org/officeDocument/2006/relationships" xmlns:p="http://schemas.openxmlformats.org/presentationml/2006/main">
+  <p:cSld>
+    <p:spTree>
+      <p:nvGrpSpPr>
+        <p:cNvPr id="1" name=""/>
+        <p:cNvGrpSpPr/>
+        <p:nvPr/>
+      </p:nvGrpSpPr>
+      <p:grpSpPr>
+        <a:xfrm>
+          <a:off x="0" y="0"/>
+          <a:ext cx="0" cy="0"/>
+          <a:chOff x="0" y="0"/>
+          <a:chExt cx="0" cy="0"/>
+        </a:xfrm>
+      </p:grpSpPr>
+      <p:sp>
+        <p:nvSpPr>
+          <p:cNvPr id="2" name="Slide Image Placeholder 1"/>
+          <p:cNvSpPr>
+            <a:spLocks noGrp="1" noRot="1" noChangeAspect="1"/>
+          </p:cNvSpPr>
+          <p:nvPr>
+            <p:ph type="sldImg"/>
+          </p:nvPr>
+        </p:nvSpPr>
+        <p:spPr/>
+      </p:sp>
+      <p:sp>
+        <p:nvSpPr>
+          <p:cNvPr id="3" name="Notes Placeholder 2"/>
+          <p:cNvSpPr>
+            <a:spLocks noGrp="1"/>
+          </p:cNvSpPr>
+          <p:nvPr>
+            <p:ph type="body" idx="1"/>
+          </p:nvPr>
+        </p:nvSpPr>
+        <p:spPr/>
+        <p:txBody>
+          <a:bodyPr/>
+          <a:lstStyle/>
+          <a:p>
+            <a:r>
+              <a:rPr lang="en-US" dirty="0"/>
+              <a:t>Duncan</a:t>
+            </a:r>
+          </a:p>
+        </p:txBody>
+      </p:sp>
+      <p:sp>
+        <p:nvSpPr>
+          <p:cNvPr id="4" name="Slide Number Placeholder 3"/>
+          <p:cNvSpPr>
+            <a:spLocks noGrp="1"/>
+          </p:cNvSpPr>
+          <p:nvPr>
+            <p:ph type="sldNum" sz="quarter" idx="5"/>
+          </p:nvPr>
+        </p:nvSpPr>
+        <p:spPr/>
+        <p:txBody>
+          <a:bodyPr/>
+          <a:lstStyle/>
+          <a:p>
+            <a:fld id="{0D8C348F-56DB-4CE2-B61D-80F8FC89407A}" type="slidenum">
+              <a:rPr lang="en-US" smtClean="0"/>
+              <a:t>2</a:t>
+            </a:fld>
+            <a:endParaRPr lang="en-US"/>
+          </a:p>
+        </p:txBody>
+      </p:sp>
+    </p:spTree>
+    <p:extLst>
+      <p:ext uri="{BB962C8B-B14F-4D97-AF65-F5344CB8AC3E}">
+        <p14:creationId xmlns:p14="http://schemas.microsoft.com/office/powerpoint/2010/main" val="4147406374"/>
+      </p:ext>
+    </p:extLst>
+  </p:cSld>
+  <p:clrMapOvr>
+    <a:masterClrMapping/>
+  </p:clrMapOvr>
+</p:notes>
+</file>
+
+<file path=ppt/notesSlides/notesSlide3.xml><?xml version="1.0" encoding="utf-8"?>
+<p:notes xmlns:a="http://schemas.openxmlformats.org/drawingml/2006/main" xmlns:r="http://schemas.openxmlformats.org/officeDocument/2006/relationships" xmlns:p="http://schemas.openxmlformats.org/presentationml/2006/main">
+  <p:cSld>
+    <p:spTree>
+      <p:nvGrpSpPr>
+        <p:cNvPr id="1" name=""/>
+        <p:cNvGrpSpPr/>
+        <p:nvPr/>
+      </p:nvGrpSpPr>
+      <p:grpSpPr>
+        <a:xfrm>
+          <a:off x="0" y="0"/>
+          <a:ext cx="0" cy="0"/>
+          <a:chOff x="0" y="0"/>
+          <a:chExt cx="0" cy="0"/>
+        </a:xfrm>
+      </p:grpSpPr>
+      <p:sp>
+        <p:nvSpPr>
+          <p:cNvPr id="2" name="Slide Image Placeholder 1"/>
+          <p:cNvSpPr>
+            <a:spLocks noGrp="1" noRot="1" noChangeAspect="1"/>
+          </p:cNvSpPr>
+          <p:nvPr>
+            <p:ph type="sldImg"/>
+          </p:nvPr>
+        </p:nvSpPr>
+        <p:spPr/>
+      </p:sp>
+      <p:sp>
+        <p:nvSpPr>
+          <p:cNvPr id="3" name="Notes Placeholder 2"/>
+          <p:cNvSpPr>
+            <a:spLocks noGrp="1"/>
+          </p:cNvSpPr>
+          <p:nvPr>
+            <p:ph type="body" idx="1"/>
+          </p:nvPr>
+        </p:nvSpPr>
+        <p:spPr/>
+        <p:txBody>
+          <a:bodyPr/>
+          <a:lstStyle/>
+          <a:p>
+            <a:r>
+              <a:rPr lang="en-US" dirty="0"/>
+              <a:t>Duncan</a:t>
+            </a:r>
+          </a:p>
+        </p:txBody>
+      </p:sp>
+      <p:sp>
+        <p:nvSpPr>
+          <p:cNvPr id="4" name="Slide Number Placeholder 3"/>
+          <p:cNvSpPr>
+            <a:spLocks noGrp="1"/>
+          </p:cNvSpPr>
+          <p:nvPr>
+            <p:ph type="sldNum" sz="quarter" idx="5"/>
+          </p:nvPr>
+        </p:nvSpPr>
+        <p:spPr/>
+        <p:txBody>
+          <a:bodyPr/>
+          <a:lstStyle/>
+          <a:p>
+            <a:fld id="{0D8C348F-56DB-4CE2-B61D-80F8FC89407A}" type="slidenum">
+              <a:rPr lang="en-US" smtClean="0"/>
+              <a:t>3</a:t>
+            </a:fld>
+            <a:endParaRPr lang="en-US"/>
+          </a:p>
+        </p:txBody>
+      </p:sp>
+    </p:spTree>
+    <p:extLst>
+      <p:ext uri="{BB962C8B-B14F-4D97-AF65-F5344CB8AC3E}">
+        <p14:creationId xmlns:p14="http://schemas.microsoft.com/office/powerpoint/2010/main" val="237047509"/>
+      </p:ext>
+    </p:extLst>
+  </p:cSld>
+  <p:clrMapOvr>
+    <a:masterClrMapping/>
+  </p:clrMapOvr>
+</p:notes>
+</file>
+
+<file path=ppt/notesSlides/notesSlide4.xml><?xml version="1.0" encoding="utf-8"?>
+<p:notes xmlns:a="http://schemas.openxmlformats.org/drawingml/2006/main" xmlns:r="http://schemas.openxmlformats.org/officeDocument/2006/relationships" xmlns:p="http://schemas.openxmlformats.org/presentationml/2006/main">
+  <p:cSld>
+    <p:spTree>
+      <p:nvGrpSpPr>
+        <p:cNvPr id="1" name=""/>
+        <p:cNvGrpSpPr/>
+        <p:nvPr/>
+      </p:nvGrpSpPr>
+      <p:grpSpPr>
+        <a:xfrm>
+          <a:off x="0" y="0"/>
+          <a:ext cx="0" cy="0"/>
+          <a:chOff x="0" y="0"/>
+          <a:chExt cx="0" cy="0"/>
+        </a:xfrm>
+      </p:grpSpPr>
+      <p:sp>
+        <p:nvSpPr>
+          <p:cNvPr id="2" name="Slide Image Placeholder 1"/>
+          <p:cNvSpPr>
+            <a:spLocks noGrp="1" noRot="1" noChangeAspect="1"/>
+          </p:cNvSpPr>
+          <p:nvPr>
+            <p:ph type="sldImg"/>
+          </p:nvPr>
+        </p:nvSpPr>
+        <p:spPr/>
+      </p:sp>
+      <p:sp>
+        <p:nvSpPr>
+          <p:cNvPr id="3" name="Notes Placeholder 2"/>
+          <p:cNvSpPr>
+            <a:spLocks noGrp="1"/>
+          </p:cNvSpPr>
+          <p:nvPr>
+            <p:ph type="body" idx="1"/>
+          </p:nvPr>
+        </p:nvSpPr>
+        <p:spPr/>
+        <p:txBody>
+          <a:bodyPr/>
+          <a:lstStyle/>
+          <a:p>
+            <a:r>
+              <a:rPr lang="en-US" dirty="0" err="1"/>
+              <a:t>Kj</a:t>
+            </a:r>
+            <a:endParaRPr lang="en-US" dirty="0"/>
+          </a:p>
+        </p:txBody>
+      </p:sp>
+      <p:sp>
+        <p:nvSpPr>
+          <p:cNvPr id="4" name="Slide Number Placeholder 3"/>
+          <p:cNvSpPr>
+            <a:spLocks noGrp="1"/>
+          </p:cNvSpPr>
+          <p:nvPr>
+            <p:ph type="sldNum" sz="quarter" idx="5"/>
+          </p:nvPr>
+        </p:nvSpPr>
+        <p:spPr/>
+        <p:txBody>
+          <a:bodyPr/>
+          <a:lstStyle/>
+          <a:p>
+            <a:fld id="{0D8C348F-56DB-4CE2-B61D-80F8FC89407A}" type="slidenum">
+              <a:rPr lang="en-US" smtClean="0"/>
+              <a:t>4</a:t>
+            </a:fld>
+            <a:endParaRPr lang="en-US"/>
+          </a:p>
+        </p:txBody>
+      </p:sp>
+    </p:spTree>
+    <p:extLst>
+      <p:ext uri="{BB962C8B-B14F-4D97-AF65-F5344CB8AC3E}">
+        <p14:creationId xmlns:p14="http://schemas.microsoft.com/office/powerpoint/2010/main" val="4214256802"/>
+      </p:ext>
+    </p:extLst>
+  </p:cSld>
+  <p:clrMapOvr>
+    <a:masterClrMapping/>
+  </p:clrMapOvr>
+</p:notes>
+</file>
+
+<file path=ppt/notesSlides/notesSlide5.xml><?xml version="1.0" encoding="utf-8"?>
+<p:notes xmlns:a="http://schemas.openxmlformats.org/drawingml/2006/main" xmlns:r="http://schemas.openxmlformats.org/officeDocument/2006/relationships" xmlns:p="http://schemas.openxmlformats.org/presentationml/2006/main">
+  <p:cSld>
+    <p:spTree>
+      <p:nvGrpSpPr>
+        <p:cNvPr id="1" name=""/>
+        <p:cNvGrpSpPr/>
+        <p:nvPr/>
+      </p:nvGrpSpPr>
+      <p:grpSpPr>
+        <a:xfrm>
+          <a:off x="0" y="0"/>
+          <a:ext cx="0" cy="0"/>
+          <a:chOff x="0" y="0"/>
+          <a:chExt cx="0" cy="0"/>
+        </a:xfrm>
+      </p:grpSpPr>
+      <p:sp>
+        <p:nvSpPr>
+          <p:cNvPr id="2" name="Slide Image Placeholder 1"/>
+          <p:cNvSpPr>
+            <a:spLocks noGrp="1" noRot="1" noChangeAspect="1"/>
+          </p:cNvSpPr>
+          <p:nvPr>
+            <p:ph type="sldImg"/>
+          </p:nvPr>
+        </p:nvSpPr>
+        <p:spPr/>
+      </p:sp>
+      <p:sp>
+        <p:nvSpPr>
+          <p:cNvPr id="3" name="Notes Placeholder 2"/>
+          <p:cNvSpPr>
+            <a:spLocks noGrp="1"/>
+          </p:cNvSpPr>
+          <p:nvPr>
+            <p:ph type="body" idx="1"/>
+          </p:nvPr>
+        </p:nvSpPr>
+        <p:spPr/>
+        <p:txBody>
+          <a:bodyPr/>
+          <a:lstStyle/>
+          <a:p>
+            <a:r>
+              <a:rPr lang="en-US" dirty="0" err="1"/>
+              <a:t>Kj</a:t>
+            </a:r>
+            <a:endParaRPr lang="en-US" dirty="0"/>
+          </a:p>
+        </p:txBody>
+      </p:sp>
+      <p:sp>
+        <p:nvSpPr>
+          <p:cNvPr id="4" name="Slide Number Placeholder 3"/>
+          <p:cNvSpPr>
+            <a:spLocks noGrp="1"/>
+          </p:cNvSpPr>
+          <p:nvPr>
+            <p:ph type="sldNum" sz="quarter" idx="5"/>
+          </p:nvPr>
+        </p:nvSpPr>
+        <p:spPr/>
+        <p:txBody>
+          <a:bodyPr/>
+          <a:lstStyle/>
+          <a:p>
+            <a:fld id="{0D8C348F-56DB-4CE2-B61D-80F8FC89407A}" type="slidenum">
+              <a:rPr lang="en-US" smtClean="0"/>
+              <a:t>5</a:t>
+            </a:fld>
+            <a:endParaRPr lang="en-US"/>
+          </a:p>
+        </p:txBody>
+      </p:sp>
+    </p:spTree>
+    <p:extLst>
+      <p:ext uri="{BB962C8B-B14F-4D97-AF65-F5344CB8AC3E}">
+        <p14:creationId xmlns:p14="http://schemas.microsoft.com/office/powerpoint/2010/main" val="982050306"/>
+      </p:ext>
+    </p:extLst>
+  </p:cSld>
+  <p:clrMapOvr>
+    <a:masterClrMapping/>
+  </p:clrMapOvr>
+</p:notes>
+</file>
+
+<file path=ppt/notesSlides/notesSlide6.xml><?xml version="1.0" encoding="utf-8"?>
+<p:notes xmlns:a="http://schemas.openxmlformats.org/drawingml/2006/main" xmlns:r="http://schemas.openxmlformats.org/officeDocument/2006/relationships" xmlns:p="http://schemas.openxmlformats.org/presentationml/2006/main">
+  <p:cSld>
+    <p:spTree>
+      <p:nvGrpSpPr>
+        <p:cNvPr id="1" name=""/>
+        <p:cNvGrpSpPr/>
+        <p:nvPr/>
+      </p:nvGrpSpPr>
+      <p:grpSpPr>
+        <a:xfrm>
+          <a:off x="0" y="0"/>
+          <a:ext cx="0" cy="0"/>
+          <a:chOff x="0" y="0"/>
+          <a:chExt cx="0" cy="0"/>
+        </a:xfrm>
+      </p:grpSpPr>
+      <p:sp>
+        <p:nvSpPr>
+          <p:cNvPr id="2" name="Slide Image Placeholder 1"/>
+          <p:cNvSpPr>
+            <a:spLocks noGrp="1" noRot="1" noChangeAspect="1"/>
+          </p:cNvSpPr>
+          <p:nvPr>
+            <p:ph type="sldImg"/>
+          </p:nvPr>
+        </p:nvSpPr>
+        <p:spPr/>
+      </p:sp>
+      <p:sp>
+        <p:nvSpPr>
+          <p:cNvPr id="3" name="Notes Placeholder 2"/>
+          <p:cNvSpPr>
+            <a:spLocks noGrp="1"/>
+          </p:cNvSpPr>
+          <p:nvPr>
+            <p:ph type="body" idx="1"/>
+          </p:nvPr>
+        </p:nvSpPr>
+        <p:spPr/>
+        <p:txBody>
+          <a:bodyPr/>
+          <a:lstStyle/>
+          <a:p>
+            <a:r>
+              <a:rPr lang="en-US" dirty="0"/>
+              <a:t>Grant</a:t>
+            </a:r>
+          </a:p>
+        </p:txBody>
+      </p:sp>
+      <p:sp>
+        <p:nvSpPr>
+          <p:cNvPr id="4" name="Slide Number Placeholder 3"/>
+          <p:cNvSpPr>
+            <a:spLocks noGrp="1"/>
+          </p:cNvSpPr>
+          <p:nvPr>
+            <p:ph type="sldNum" sz="quarter" idx="5"/>
+          </p:nvPr>
+        </p:nvSpPr>
+        <p:spPr/>
+        <p:txBody>
+          <a:bodyPr/>
+          <a:lstStyle/>
+          <a:p>
+            <a:fld id="{0D8C348F-56DB-4CE2-B61D-80F8FC89407A}" type="slidenum">
+              <a:rPr lang="en-US" smtClean="0"/>
+              <a:t>6</a:t>
+            </a:fld>
+            <a:endParaRPr lang="en-US"/>
+          </a:p>
+        </p:txBody>
+      </p:sp>
+    </p:spTree>
+    <p:extLst>
+      <p:ext uri="{BB962C8B-B14F-4D97-AF65-F5344CB8AC3E}">
+        <p14:creationId xmlns:p14="http://schemas.microsoft.com/office/powerpoint/2010/main" val="433453044"/>
+      </p:ext>
+    </p:extLst>
+  </p:cSld>
+  <p:clrMapOvr>
+    <a:masterClrMapping/>
+  </p:clrMapOvr>
+</p:notes>
+</file>
+
+<file path=ppt/notesSlides/notesSlide7.xml><?xml version="1.0" encoding="utf-8"?>
+<p:notes xmlns:a="http://schemas.openxmlformats.org/drawingml/2006/main" xmlns:r="http://schemas.openxmlformats.org/officeDocument/2006/relationships" xmlns:p="http://schemas.openxmlformats.org/presentationml/2006/main">
+  <p:cSld>
+    <p:spTree>
+      <p:nvGrpSpPr>
+        <p:cNvPr id="1" name=""/>
+        <p:cNvGrpSpPr/>
+        <p:nvPr/>
+      </p:nvGrpSpPr>
+      <p:grpSpPr>
+        <a:xfrm>
+          <a:off x="0" y="0"/>
+          <a:ext cx="0" cy="0"/>
+          <a:chOff x="0" y="0"/>
+          <a:chExt cx="0" cy="0"/>
+        </a:xfrm>
+      </p:grpSpPr>
+      <p:sp>
+        <p:nvSpPr>
+          <p:cNvPr id="2" name="Slide Image Placeholder 1"/>
+          <p:cNvSpPr>
+            <a:spLocks noGrp="1" noRot="1" noChangeAspect="1"/>
+          </p:cNvSpPr>
+          <p:nvPr>
+            <p:ph type="sldImg"/>
+          </p:nvPr>
+        </p:nvSpPr>
+        <p:spPr/>
+      </p:sp>
+      <p:sp>
+        <p:nvSpPr>
+          <p:cNvPr id="3" name="Notes Placeholder 2"/>
+          <p:cNvSpPr>
+            <a:spLocks noGrp="1"/>
+          </p:cNvSpPr>
+          <p:nvPr>
+            <p:ph type="body" idx="1"/>
+          </p:nvPr>
+        </p:nvSpPr>
+        <p:spPr/>
+        <p:txBody>
+          <a:bodyPr/>
+          <a:lstStyle/>
+          <a:p>
+            <a:r>
+              <a:rPr lang="en-US" dirty="0"/>
+              <a:t>Grant</a:t>
+            </a:r>
+          </a:p>
+        </p:txBody>
+      </p:sp>
+      <p:sp>
+        <p:nvSpPr>
+          <p:cNvPr id="4" name="Slide Number Placeholder 3"/>
+          <p:cNvSpPr>
+            <a:spLocks noGrp="1"/>
+          </p:cNvSpPr>
+          <p:nvPr>
+            <p:ph type="sldNum" sz="quarter" idx="5"/>
+          </p:nvPr>
+        </p:nvSpPr>
+        <p:spPr/>
+        <p:txBody>
+          <a:bodyPr/>
+          <a:lstStyle/>
+          <a:p>
+            <a:fld id="{0D8C348F-56DB-4CE2-B61D-80F8FC89407A}" type="slidenum">
+              <a:rPr lang="en-US" smtClean="0"/>
+              <a:t>7</a:t>
+            </a:fld>
+            <a:endParaRPr lang="en-US"/>
+          </a:p>
+        </p:txBody>
+      </p:sp>
+    </p:spTree>
+    <p:extLst>
+      <p:ext uri="{BB962C8B-B14F-4D97-AF65-F5344CB8AC3E}">
+        <p14:creationId xmlns:p14="http://schemas.microsoft.com/office/powerpoint/2010/main" val="1449968247"/>
+      </p:ext>
+    </p:extLst>
+  </p:cSld>
+  <p:clrMapOvr>
+    <a:masterClrMapping/>
+  </p:clrMapOvr>
+</p:notes>
+</file>
+
+<file path=ppt/notesSlides/notesSlide8.xml><?xml version="1.0" encoding="utf-8"?>
+<p:notes xmlns:a="http://schemas.openxmlformats.org/drawingml/2006/main" xmlns:r="http://schemas.openxmlformats.org/officeDocument/2006/relationships" xmlns:p="http://schemas.openxmlformats.org/presentationml/2006/main">
+  <p:cSld>
+    <p:spTree>
+      <p:nvGrpSpPr>
+        <p:cNvPr id="1" name=""/>
+        <p:cNvGrpSpPr/>
+        <p:nvPr/>
+      </p:nvGrpSpPr>
+      <p:grpSpPr>
+        <a:xfrm>
+          <a:off x="0" y="0"/>
+          <a:ext cx="0" cy="0"/>
+          <a:chOff x="0" y="0"/>
+          <a:chExt cx="0" cy="0"/>
+        </a:xfrm>
+      </p:grpSpPr>
+      <p:sp>
+        <p:nvSpPr>
+          <p:cNvPr id="2" name="Slide Image Placeholder 1"/>
+          <p:cNvSpPr>
+            <a:spLocks noGrp="1" noRot="1" noChangeAspect="1"/>
+          </p:cNvSpPr>
+          <p:nvPr>
+            <p:ph type="sldImg"/>
+          </p:nvPr>
+        </p:nvSpPr>
+        <p:spPr/>
+      </p:sp>
+      <p:sp>
+        <p:nvSpPr>
+          <p:cNvPr id="3" name="Notes Placeholder 2"/>
+          <p:cNvSpPr>
+            <a:spLocks noGrp="1"/>
+          </p:cNvSpPr>
+          <p:nvPr>
+            <p:ph type="body" idx="1"/>
+          </p:nvPr>
+        </p:nvSpPr>
+        <p:spPr/>
+        <p:txBody>
+          <a:bodyPr/>
+          <a:lstStyle/>
+          <a:p>
+            <a:r>
+              <a:rPr lang="en-US" dirty="0"/>
+              <a:t>Kaden</a:t>
+            </a:r>
+          </a:p>
+        </p:txBody>
+      </p:sp>
+      <p:sp>
+        <p:nvSpPr>
+          <p:cNvPr id="4" name="Slide Number Placeholder 3"/>
+          <p:cNvSpPr>
+            <a:spLocks noGrp="1"/>
+          </p:cNvSpPr>
+          <p:nvPr>
+            <p:ph type="sldNum" sz="quarter" idx="5"/>
+          </p:nvPr>
+        </p:nvSpPr>
+        <p:spPr/>
+        <p:txBody>
+          <a:bodyPr/>
+          <a:lstStyle/>
+          <a:p>
+            <a:fld id="{0D8C348F-56DB-4CE2-B61D-80F8FC89407A}" type="slidenum">
+              <a:rPr lang="en-US" smtClean="0"/>
+              <a:t>8</a:t>
+            </a:fld>
+            <a:endParaRPr lang="en-US"/>
+          </a:p>
+        </p:txBody>
+      </p:sp>
+    </p:spTree>
+    <p:extLst>
+      <p:ext uri="{BB962C8B-B14F-4D97-AF65-F5344CB8AC3E}">
+        <p14:creationId xmlns:p14="http://schemas.microsoft.com/office/powerpoint/2010/main" val="123943321"/>
+      </p:ext>
+    </p:extLst>
+  </p:cSld>
+  <p:clrMapOvr>
+    <a:masterClrMapping/>
+  </p:clrMapOvr>
+</p:notes>
+</file>
+
+<file path=ppt/notesSlides/notesSlide9.xml><?xml version="1.0" encoding="utf-8"?>
+<p:notes xmlns:a="http://schemas.openxmlformats.org/drawingml/2006/main" xmlns:r="http://schemas.openxmlformats.org/officeDocument/2006/relationships" xmlns:p="http://schemas.openxmlformats.org/presentationml/2006/main">
+  <p:cSld>
+    <p:spTree>
+      <p:nvGrpSpPr>
+        <p:cNvPr id="1" name=""/>
+        <p:cNvGrpSpPr/>
+        <p:nvPr/>
+      </p:nvGrpSpPr>
+      <p:grpSpPr>
+        <a:xfrm>
+          <a:off x="0" y="0"/>
+          <a:ext cx="0" cy="0"/>
+          <a:chOff x="0" y="0"/>
+          <a:chExt cx="0" cy="0"/>
+        </a:xfrm>
+      </p:grpSpPr>
+      <p:sp>
+        <p:nvSpPr>
+          <p:cNvPr id="2" name="Slide Image Placeholder 1"/>
+          <p:cNvSpPr>
+            <a:spLocks noGrp="1" noRot="1" noChangeAspect="1"/>
+          </p:cNvSpPr>
+          <p:nvPr>
+            <p:ph type="sldImg"/>
+          </p:nvPr>
+        </p:nvSpPr>
+        <p:spPr/>
+      </p:sp>
+      <p:sp>
+        <p:nvSpPr>
+          <p:cNvPr id="3" name="Notes Placeholder 2"/>
+          <p:cNvSpPr>
+            <a:spLocks noGrp="1"/>
+          </p:cNvSpPr>
+          <p:nvPr>
+            <p:ph type="body" idx="1"/>
+          </p:nvPr>
+        </p:nvSpPr>
+        <p:spPr/>
+        <p:txBody>
+          <a:bodyPr/>
+          <a:lstStyle/>
+          <a:p>
+            <a:r>
+              <a:rPr lang="en-US" dirty="0"/>
+              <a:t>Kaden</a:t>
+            </a:r>
+          </a:p>
+        </p:txBody>
+      </p:sp>
+      <p:sp>
+        <p:nvSpPr>
+          <p:cNvPr id="4" name="Slide Number Placeholder 3"/>
+          <p:cNvSpPr>
+            <a:spLocks noGrp="1"/>
+          </p:cNvSpPr>
+          <p:nvPr>
+            <p:ph type="sldNum" sz="quarter" idx="5"/>
+          </p:nvPr>
+        </p:nvSpPr>
+        <p:spPr/>
+        <p:txBody>
+          <a:bodyPr/>
+          <a:lstStyle/>
+          <a:p>
+            <a:fld id="{0D8C348F-56DB-4CE2-B61D-80F8FC89407A}" type="slidenum">
+              <a:rPr lang="en-US" smtClean="0"/>
+              <a:t>9</a:t>
+            </a:fld>
+            <a:endParaRPr lang="en-US"/>
+          </a:p>
+        </p:txBody>
+      </p:sp>
+    </p:spTree>
+    <p:extLst>
+      <p:ext uri="{BB962C8B-B14F-4D97-AF65-F5344CB8AC3E}">
+        <p14:creationId xmlns:p14="http://schemas.microsoft.com/office/powerpoint/2010/main" val="4196798263"/>
       </p:ext>
     </p:extLst>
   </p:cSld>
@@ -11342,7 +12043,7 @@
           <p:nvPr/>
         </p:nvPicPr>
         <p:blipFill>
-          <a:blip r:embed="rId2">
+          <a:blip r:embed="rId3">
             <a:extLst>
               <a:ext uri="{28A0092B-C50C-407E-A947-70E740481C1C}">
                 <a14:useLocalDpi xmlns:a14="http://schemas.microsoft.com/office/drawing/2010/main" val="0"/>
@@ -11518,7 +12219,7 @@
           <p:nvPr/>
         </p:nvPicPr>
         <p:blipFill>
-          <a:blip r:embed="rId2">
+          <a:blip r:embed="rId3">
             <a:extLst>
               <a:ext uri="{28A0092B-C50C-407E-A947-70E740481C1C}">
                 <a14:useLocalDpi xmlns:a14="http://schemas.microsoft.com/office/drawing/2010/main" val="0"/>
@@ -11638,7 +12339,7 @@
                   <a:srgbClr val="FFFFFF"/>
                 </a:solidFill>
               </a:rPr>
-              <a:t>Ours doesn’t Lack of security</a:t>
+              <a:t>Ours doesn’t lack security</a:t>
             </a:r>
           </a:p>
           <a:p>
@@ -11657,7 +12358,7 @@
                   <a:srgbClr val="FFFFFF"/>
                 </a:solidFill>
               </a:rPr>
-              <a:t>Ours doesn’t have Poor organization</a:t>
+              <a:t>Ours doesn’t have poor organization</a:t>
             </a:r>
           </a:p>
           <a:p>
@@ -11859,7 +12560,7 @@
         </p:xfrm>
         <a:graphic>
           <a:graphicData uri="http://schemas.openxmlformats.org/drawingml/2006/diagram">
-            <dgm:relIds xmlns:dgm="http://schemas.openxmlformats.org/drawingml/2006/diagram" xmlns:r="http://schemas.openxmlformats.org/officeDocument/2006/relationships" r:dm="rId2" r:lo="rId3" r:qs="rId4" r:cs="rId5"/>
+            <dgm:relIds xmlns:dgm="http://schemas.openxmlformats.org/drawingml/2006/diagram" xmlns:r="http://schemas.openxmlformats.org/officeDocument/2006/relationships" r:dm="rId3" r:lo="rId4" r:qs="rId5" r:cs="rId6"/>
           </a:graphicData>
         </a:graphic>
       </p:graphicFrame>
@@ -12211,7 +12912,7 @@
         </p:xfrm>
         <a:graphic>
           <a:graphicData uri="http://schemas.openxmlformats.org/drawingml/2006/diagram">
-            <dgm:relIds xmlns:dgm="http://schemas.openxmlformats.org/drawingml/2006/diagram" xmlns:r="http://schemas.openxmlformats.org/officeDocument/2006/relationships" r:dm="rId2" r:lo="rId3" r:qs="rId4" r:cs="rId5"/>
+            <dgm:relIds xmlns:dgm="http://schemas.openxmlformats.org/drawingml/2006/diagram" xmlns:r="http://schemas.openxmlformats.org/officeDocument/2006/relationships" r:dm="rId3" r:lo="rId4" r:qs="rId5" r:cs="rId6"/>
           </a:graphicData>
         </a:graphic>
       </p:graphicFrame>
@@ -12365,7 +13066,7 @@
           <p:nvPr/>
         </p:nvPicPr>
         <p:blipFill>
-          <a:blip r:embed="rId2">
+          <a:blip r:embed="rId3">
             <a:extLst>
               <a:ext uri="{28A0092B-C50C-407E-A947-70E740481C1C}">
                 <a14:useLocalDpi xmlns:a14="http://schemas.microsoft.com/office/drawing/2010/main" val="0"/>
@@ -12589,7 +13290,7 @@
           </p:nvPr>
         </p:nvPicPr>
         <p:blipFill>
-          <a:blip r:embed="rId2">
+          <a:blip r:embed="rId3">
             <a:extLst>
               <a:ext uri="{28A0092B-C50C-407E-A947-70E740481C1C}">
                 <a14:useLocalDpi xmlns:a14="http://schemas.microsoft.com/office/drawing/2010/main" val="0"/>
@@ -13018,7 +13719,7 @@
           <p:nvPr/>
         </p:nvPicPr>
         <p:blipFill>
-          <a:blip r:embed="rId2">
+          <a:blip r:embed="rId3">
             <a:extLst>
               <a:ext uri="{28A0092B-C50C-407E-A947-70E740481C1C}">
                 <a14:useLocalDpi xmlns:a14="http://schemas.microsoft.com/office/drawing/2010/main" val="0"/>
@@ -13533,7 +14234,7 @@
           </p:nvPr>
         </p:nvPicPr>
         <p:blipFill>
-          <a:blip r:embed="rId2">
+          <a:blip r:embed="rId3">
             <a:extLst>
               <a:ext uri="{28A0092B-C50C-407E-A947-70E740481C1C}">
                 <a14:useLocalDpi xmlns:a14="http://schemas.microsoft.com/office/drawing/2010/main" val="0"/>

</xml_diff>